<commit_message>
Add example for fetch_content.
</commit_message>
<xml_diff>
--- a/Cmake And vcpkg.pptx
+++ b/Cmake And vcpkg.pptx
@@ -9,18 +9,19 @@
     <p:sldId id="284" r:id="rId3"/>
     <p:sldId id="285" r:id="rId4"/>
     <p:sldId id="286" r:id="rId5"/>
-    <p:sldId id="276" r:id="rId6"/>
-    <p:sldId id="279" r:id="rId7"/>
-    <p:sldId id="277" r:id="rId8"/>
-    <p:sldId id="280" r:id="rId9"/>
-    <p:sldId id="287" r:id="rId10"/>
-    <p:sldId id="278" r:id="rId11"/>
-    <p:sldId id="281" r:id="rId12"/>
-    <p:sldId id="257" r:id="rId13"/>
-    <p:sldId id="282" r:id="rId14"/>
-    <p:sldId id="288" r:id="rId15"/>
-    <p:sldId id="283" r:id="rId16"/>
-    <p:sldId id="289" r:id="rId17"/>
+    <p:sldId id="290" r:id="rId6"/>
+    <p:sldId id="276" r:id="rId7"/>
+    <p:sldId id="279" r:id="rId8"/>
+    <p:sldId id="277" r:id="rId9"/>
+    <p:sldId id="280" r:id="rId10"/>
+    <p:sldId id="287" r:id="rId11"/>
+    <p:sldId id="278" r:id="rId12"/>
+    <p:sldId id="281" r:id="rId13"/>
+    <p:sldId id="257" r:id="rId14"/>
+    <p:sldId id="282" r:id="rId15"/>
+    <p:sldId id="288" r:id="rId16"/>
+    <p:sldId id="283" r:id="rId17"/>
+    <p:sldId id="289" r:id="rId18"/>
   </p:sldIdLst>
   <p:sldSz cx="12192000" cy="6858000"/>
   <p:notesSz cx="6858000" cy="9144000"/>
@@ -274,7 +275,7 @@
           <a:p>
             <a:fld id="{3225BDDF-8AFC-4324-BEEA-2F614A8DB37C}" type="datetimeFigureOut">
               <a:rPr lang="de-DE" smtClean="0"/>
-              <a:t>12.05.2021</a:t>
+              <a:t>17.04.2023</a:t>
             </a:fld>
             <a:endParaRPr lang="de-DE"/>
           </a:p>
@@ -328,7 +329,7 @@
           <a:p>
             <a:fld id="{F24D96FF-E900-4528-B6B3-83048652B092}" type="slidenum">
               <a:rPr lang="de-DE" smtClean="0"/>
-              <a:t>‹Nr.›</a:t>
+              <a:t>‹#›</a:t>
             </a:fld>
             <a:endParaRPr lang="de-DE"/>
           </a:p>
@@ -472,7 +473,7 @@
           <a:p>
             <a:fld id="{3225BDDF-8AFC-4324-BEEA-2F614A8DB37C}" type="datetimeFigureOut">
               <a:rPr lang="de-DE" smtClean="0"/>
-              <a:t>12.05.2021</a:t>
+              <a:t>17.04.2023</a:t>
             </a:fld>
             <a:endParaRPr lang="de-DE"/>
           </a:p>
@@ -526,7 +527,7 @@
           <a:p>
             <a:fld id="{F24D96FF-E900-4528-B6B3-83048652B092}" type="slidenum">
               <a:rPr lang="de-DE" smtClean="0"/>
-              <a:t>‹Nr.›</a:t>
+              <a:t>‹#›</a:t>
             </a:fld>
             <a:endParaRPr lang="de-DE"/>
           </a:p>
@@ -680,7 +681,7 @@
           <a:p>
             <a:fld id="{3225BDDF-8AFC-4324-BEEA-2F614A8DB37C}" type="datetimeFigureOut">
               <a:rPr lang="de-DE" smtClean="0"/>
-              <a:t>12.05.2021</a:t>
+              <a:t>17.04.2023</a:t>
             </a:fld>
             <a:endParaRPr lang="de-DE"/>
           </a:p>
@@ -734,7 +735,7 @@
           <a:p>
             <a:fld id="{F24D96FF-E900-4528-B6B3-83048652B092}" type="slidenum">
               <a:rPr lang="de-DE" smtClean="0"/>
-              <a:t>‹Nr.›</a:t>
+              <a:t>‹#›</a:t>
             </a:fld>
             <a:endParaRPr lang="de-DE"/>
           </a:p>
@@ -878,7 +879,7 @@
           <a:p>
             <a:fld id="{3225BDDF-8AFC-4324-BEEA-2F614A8DB37C}" type="datetimeFigureOut">
               <a:rPr lang="de-DE" smtClean="0"/>
-              <a:t>12.05.2021</a:t>
+              <a:t>17.04.2023</a:t>
             </a:fld>
             <a:endParaRPr lang="de-DE"/>
           </a:p>
@@ -932,7 +933,7 @@
           <a:p>
             <a:fld id="{F24D96FF-E900-4528-B6B3-83048652B092}" type="slidenum">
               <a:rPr lang="de-DE" smtClean="0"/>
-              <a:t>‹Nr.›</a:t>
+              <a:t>‹#›</a:t>
             </a:fld>
             <a:endParaRPr lang="de-DE"/>
           </a:p>
@@ -1153,7 +1154,7 @@
           <a:p>
             <a:fld id="{3225BDDF-8AFC-4324-BEEA-2F614A8DB37C}" type="datetimeFigureOut">
               <a:rPr lang="de-DE" smtClean="0"/>
-              <a:t>12.05.2021</a:t>
+              <a:t>17.04.2023</a:t>
             </a:fld>
             <a:endParaRPr lang="de-DE"/>
           </a:p>
@@ -1207,7 +1208,7 @@
           <a:p>
             <a:fld id="{F24D96FF-E900-4528-B6B3-83048652B092}" type="slidenum">
               <a:rPr lang="de-DE" smtClean="0"/>
-              <a:t>‹Nr.›</a:t>
+              <a:t>‹#›</a:t>
             </a:fld>
             <a:endParaRPr lang="de-DE"/>
           </a:p>
@@ -1418,7 +1419,7 @@
           <a:p>
             <a:fld id="{3225BDDF-8AFC-4324-BEEA-2F614A8DB37C}" type="datetimeFigureOut">
               <a:rPr lang="de-DE" smtClean="0"/>
-              <a:t>12.05.2021</a:t>
+              <a:t>17.04.2023</a:t>
             </a:fld>
             <a:endParaRPr lang="de-DE"/>
           </a:p>
@@ -1472,7 +1473,7 @@
           <a:p>
             <a:fld id="{F24D96FF-E900-4528-B6B3-83048652B092}" type="slidenum">
               <a:rPr lang="de-DE" smtClean="0"/>
-              <a:t>‹Nr.›</a:t>
+              <a:t>‹#›</a:t>
             </a:fld>
             <a:endParaRPr lang="de-DE"/>
           </a:p>
@@ -1830,7 +1831,7 @@
           <a:p>
             <a:fld id="{3225BDDF-8AFC-4324-BEEA-2F614A8DB37C}" type="datetimeFigureOut">
               <a:rPr lang="de-DE" smtClean="0"/>
-              <a:t>12.05.2021</a:t>
+              <a:t>17.04.2023</a:t>
             </a:fld>
             <a:endParaRPr lang="de-DE"/>
           </a:p>
@@ -1884,7 +1885,7 @@
           <a:p>
             <a:fld id="{F24D96FF-E900-4528-B6B3-83048652B092}" type="slidenum">
               <a:rPr lang="de-DE" smtClean="0"/>
-              <a:t>‹Nr.›</a:t>
+              <a:t>‹#›</a:t>
             </a:fld>
             <a:endParaRPr lang="de-DE"/>
           </a:p>
@@ -1971,7 +1972,7 @@
           <a:p>
             <a:fld id="{3225BDDF-8AFC-4324-BEEA-2F614A8DB37C}" type="datetimeFigureOut">
               <a:rPr lang="de-DE" smtClean="0"/>
-              <a:t>12.05.2021</a:t>
+              <a:t>17.04.2023</a:t>
             </a:fld>
             <a:endParaRPr lang="de-DE"/>
           </a:p>
@@ -2025,7 +2026,7 @@
           <a:p>
             <a:fld id="{F24D96FF-E900-4528-B6B3-83048652B092}" type="slidenum">
               <a:rPr lang="de-DE" smtClean="0"/>
-              <a:t>‹Nr.›</a:t>
+              <a:t>‹#›</a:t>
             </a:fld>
             <a:endParaRPr lang="de-DE"/>
           </a:p>
@@ -2084,7 +2085,7 @@
           <a:p>
             <a:fld id="{3225BDDF-8AFC-4324-BEEA-2F614A8DB37C}" type="datetimeFigureOut">
               <a:rPr lang="de-DE" smtClean="0"/>
-              <a:t>12.05.2021</a:t>
+              <a:t>17.04.2023</a:t>
             </a:fld>
             <a:endParaRPr lang="de-DE"/>
           </a:p>
@@ -2138,7 +2139,7 @@
           <a:p>
             <a:fld id="{F24D96FF-E900-4528-B6B3-83048652B092}" type="slidenum">
               <a:rPr lang="de-DE" smtClean="0"/>
-              <a:t>‹Nr.›</a:t>
+              <a:t>‹#›</a:t>
             </a:fld>
             <a:endParaRPr lang="de-DE"/>
           </a:p>
@@ -2395,7 +2396,7 @@
           <a:p>
             <a:fld id="{3225BDDF-8AFC-4324-BEEA-2F614A8DB37C}" type="datetimeFigureOut">
               <a:rPr lang="de-DE" smtClean="0"/>
-              <a:t>12.05.2021</a:t>
+              <a:t>17.04.2023</a:t>
             </a:fld>
             <a:endParaRPr lang="de-DE"/>
           </a:p>
@@ -2449,7 +2450,7 @@
           <a:p>
             <a:fld id="{F24D96FF-E900-4528-B6B3-83048652B092}" type="slidenum">
               <a:rPr lang="de-DE" smtClean="0"/>
-              <a:t>‹Nr.›</a:t>
+              <a:t>‹#›</a:t>
             </a:fld>
             <a:endParaRPr lang="de-DE"/>
           </a:p>
@@ -2683,7 +2684,7 @@
           <a:p>
             <a:fld id="{3225BDDF-8AFC-4324-BEEA-2F614A8DB37C}" type="datetimeFigureOut">
               <a:rPr lang="de-DE" smtClean="0"/>
-              <a:t>12.05.2021</a:t>
+              <a:t>17.04.2023</a:t>
             </a:fld>
             <a:endParaRPr lang="de-DE"/>
           </a:p>
@@ -2737,7 +2738,7 @@
           <a:p>
             <a:fld id="{F24D96FF-E900-4528-B6B3-83048652B092}" type="slidenum">
               <a:rPr lang="de-DE" smtClean="0"/>
-              <a:t>‹Nr.›</a:t>
+              <a:t>‹#›</a:t>
             </a:fld>
             <a:endParaRPr lang="de-DE"/>
           </a:p>
@@ -2924,7 +2925,7 @@
           <a:p>
             <a:fld id="{3225BDDF-8AFC-4324-BEEA-2F614A8DB37C}" type="datetimeFigureOut">
               <a:rPr lang="de-DE" smtClean="0"/>
-              <a:t>12.05.2021</a:t>
+              <a:t>17.04.2023</a:t>
             </a:fld>
             <a:endParaRPr lang="de-DE"/>
           </a:p>
@@ -3014,7 +3015,7 @@
           <a:p>
             <a:fld id="{F24D96FF-E900-4528-B6B3-83048652B092}" type="slidenum">
               <a:rPr lang="de-DE" smtClean="0"/>
-              <a:t>‹Nr.›</a:t>
+              <a:t>‹#›</a:t>
             </a:fld>
             <a:endParaRPr lang="de-DE"/>
           </a:p>
@@ -3450,124 +3451,33 @@
           <p:cNvPr id="2" name="Titel 1">
             <a:extLst>
               <a:ext uri="{FF2B5EF4-FFF2-40B4-BE49-F238E27FC236}">
-                <a16:creationId xmlns:a16="http://schemas.microsoft.com/office/drawing/2014/main" id="{930DE0D6-735B-4B6B-A028-9BF4EB0AD163}"/>
-              </a:ext>
-            </a:extLst>
-          </p:cNvPr>
-          <p:cNvSpPr>
-            <a:spLocks noGrp="1"/>
-          </p:cNvSpPr>
-          <p:nvPr>
-            <p:ph type="title"/>
-          </p:nvPr>
-        </p:nvSpPr>
-        <p:spPr/>
-        <p:txBody>
-          <a:bodyPr/>
-          <a:lstStyle/>
-          <a:p>
-            <a:r>
-              <a:rPr lang="en-US" dirty="0"/>
-              <a:t>Working with libs</a:t>
-            </a:r>
-          </a:p>
-        </p:txBody>
-      </p:sp>
-      <p:sp>
-        <p:nvSpPr>
-          <p:cNvPr id="3" name="Inhaltsplatzhalter 2">
-            <a:extLst>
-              <a:ext uri="{FF2B5EF4-FFF2-40B4-BE49-F238E27FC236}">
-                <a16:creationId xmlns:a16="http://schemas.microsoft.com/office/drawing/2014/main" id="{7FBD8B96-A181-4327-8619-E8094BF4C293}"/>
-              </a:ext>
-            </a:extLst>
-          </p:cNvPr>
-          <p:cNvSpPr>
-            <a:spLocks noGrp="1"/>
-          </p:cNvSpPr>
-          <p:nvPr>
-            <p:ph idx="1"/>
-          </p:nvPr>
-        </p:nvSpPr>
-        <p:spPr/>
-        <p:txBody>
-          <a:bodyPr/>
-          <a:lstStyle/>
-          <a:p>
-            <a:r>
-              <a:rPr lang="en-US" dirty="0"/>
-              <a:t>Install lib using CMake</a:t>
-            </a:r>
-          </a:p>
-          <a:p>
-            <a:pPr lvl="1"/>
-            <a:r>
-              <a:rPr lang="en-US" dirty="0"/>
-              <a:t>On Windows, create a </a:t>
-            </a:r>
-            <a:r>
-              <a:rPr lang="en-US" i="1" dirty="0"/>
-              <a:t>lib</a:t>
-            </a:r>
-            <a:r>
-              <a:rPr lang="en-US" dirty="0"/>
-              <a:t> folder and use it as CMAKE_INSTALL_PREFIX</a:t>
-            </a:r>
-          </a:p>
-          <a:p>
-            <a:r>
-              <a:rPr lang="en-US" dirty="0"/>
-              <a:t>Use </a:t>
-            </a:r>
-            <a:r>
-              <a:rPr lang="en-US" dirty="0" err="1"/>
-              <a:t>find_package</a:t>
-            </a:r>
-            <a:r>
-              <a:rPr lang="en-US" dirty="0"/>
-              <a:t>() to add the lib to your code</a:t>
-            </a:r>
-            <a:br>
-              <a:rPr lang="en-US" dirty="0"/>
-            </a:br>
-            <a:endParaRPr lang="en-US" dirty="0"/>
-          </a:p>
-          <a:p>
-            <a:r>
-              <a:rPr lang="en-US" dirty="0"/>
-              <a:t>THIS IS ANNOYING</a:t>
-            </a:r>
-          </a:p>
-          <a:p>
-            <a:pPr lvl="1"/>
-            <a:r>
-              <a:rPr lang="en-US" dirty="0"/>
-              <a:t>Not all libs use CMake, many do not keep up with the new standards</a:t>
-            </a:r>
-          </a:p>
-          <a:p>
-            <a:pPr lvl="1"/>
-            <a:r>
-              <a:rPr lang="en-US" dirty="0"/>
-              <a:t>Updating libs is pain (e.g. after installing a new compiler)</a:t>
-            </a:r>
-          </a:p>
-          <a:p>
-            <a:pPr lvl="1"/>
-            <a:r>
-              <a:rPr lang="en-US" dirty="0"/>
-              <a:t>Finding out the correct package to include is not as easy as it should be</a:t>
-            </a:r>
-          </a:p>
-          <a:p>
-            <a:endParaRPr lang="en-US" dirty="0"/>
+                <a16:creationId xmlns:a16="http://schemas.microsoft.com/office/drawing/2014/main" id="{5E801DC5-9E65-44F3-88CF-84AD1C85B2C1}"/>
+              </a:ext>
+            </a:extLst>
+          </p:cNvPr>
+          <p:cNvSpPr>
+            <a:spLocks noGrp="1"/>
+          </p:cNvSpPr>
+          <p:nvPr>
+            <p:ph type="ctrTitle"/>
+          </p:nvPr>
+        </p:nvSpPr>
+        <p:spPr/>
+        <p:txBody>
+          <a:bodyPr/>
+          <a:lstStyle/>
+          <a:p>
+            <a:r>
+              <a:rPr lang="en-US" dirty="0"/>
+              <a:t>ex03_libs</a:t>
+            </a:r>
           </a:p>
         </p:txBody>
       </p:sp>
     </p:spTree>
     <p:extLst>
       <p:ext uri="{BB962C8B-B14F-4D97-AF65-F5344CB8AC3E}">
-        <p14:creationId xmlns:p14="http://schemas.microsoft.com/office/powerpoint/2010/main" val="4083439808"/>
+        <p14:creationId xmlns:p14="http://schemas.microsoft.com/office/powerpoint/2010/main" val="2957862683"/>
       </p:ext>
     </p:extLst>
   </p:cSld>
@@ -3599,33 +3509,124 @@
           <p:cNvPr id="2" name="Titel 1">
             <a:extLst>
               <a:ext uri="{FF2B5EF4-FFF2-40B4-BE49-F238E27FC236}">
-                <a16:creationId xmlns:a16="http://schemas.microsoft.com/office/drawing/2014/main" id="{5E801DC5-9E65-44F3-88CF-84AD1C85B2C1}"/>
-              </a:ext>
-            </a:extLst>
-          </p:cNvPr>
-          <p:cNvSpPr>
-            <a:spLocks noGrp="1"/>
-          </p:cNvSpPr>
-          <p:nvPr>
-            <p:ph type="ctrTitle"/>
-          </p:nvPr>
-        </p:nvSpPr>
-        <p:spPr/>
-        <p:txBody>
-          <a:bodyPr/>
-          <a:lstStyle/>
-          <a:p>
-            <a:r>
-              <a:rPr lang="en-US" dirty="0"/>
-              <a:t>ex04_submodules</a:t>
-            </a:r>
+                <a16:creationId xmlns:a16="http://schemas.microsoft.com/office/drawing/2014/main" id="{930DE0D6-735B-4B6B-A028-9BF4EB0AD163}"/>
+              </a:ext>
+            </a:extLst>
+          </p:cNvPr>
+          <p:cNvSpPr>
+            <a:spLocks noGrp="1"/>
+          </p:cNvSpPr>
+          <p:nvPr>
+            <p:ph type="title"/>
+          </p:nvPr>
+        </p:nvSpPr>
+        <p:spPr/>
+        <p:txBody>
+          <a:bodyPr/>
+          <a:lstStyle/>
+          <a:p>
+            <a:r>
+              <a:rPr lang="en-US" dirty="0"/>
+              <a:t>Working with libs</a:t>
+            </a:r>
+          </a:p>
+        </p:txBody>
+      </p:sp>
+      <p:sp>
+        <p:nvSpPr>
+          <p:cNvPr id="3" name="Inhaltsplatzhalter 2">
+            <a:extLst>
+              <a:ext uri="{FF2B5EF4-FFF2-40B4-BE49-F238E27FC236}">
+                <a16:creationId xmlns:a16="http://schemas.microsoft.com/office/drawing/2014/main" id="{7FBD8B96-A181-4327-8619-E8094BF4C293}"/>
+              </a:ext>
+            </a:extLst>
+          </p:cNvPr>
+          <p:cNvSpPr>
+            <a:spLocks noGrp="1"/>
+          </p:cNvSpPr>
+          <p:nvPr>
+            <p:ph idx="1"/>
+          </p:nvPr>
+        </p:nvSpPr>
+        <p:spPr/>
+        <p:txBody>
+          <a:bodyPr/>
+          <a:lstStyle/>
+          <a:p>
+            <a:r>
+              <a:rPr lang="en-US" dirty="0"/>
+              <a:t>Install lib using CMake</a:t>
+            </a:r>
+          </a:p>
+          <a:p>
+            <a:pPr lvl="1"/>
+            <a:r>
+              <a:rPr lang="en-US" dirty="0"/>
+              <a:t>On Windows, create a </a:t>
+            </a:r>
+            <a:r>
+              <a:rPr lang="en-US" i="1" dirty="0"/>
+              <a:t>lib</a:t>
+            </a:r>
+            <a:r>
+              <a:rPr lang="en-US" dirty="0"/>
+              <a:t> folder and use it as CMAKE_INSTALL_PREFIX</a:t>
+            </a:r>
+          </a:p>
+          <a:p>
+            <a:r>
+              <a:rPr lang="en-US" dirty="0"/>
+              <a:t>Use </a:t>
+            </a:r>
+            <a:r>
+              <a:rPr lang="en-US" dirty="0" err="1"/>
+              <a:t>find_package</a:t>
+            </a:r>
+            <a:r>
+              <a:rPr lang="en-US" dirty="0"/>
+              <a:t>() to add the lib to your code</a:t>
+            </a:r>
+            <a:br>
+              <a:rPr lang="en-US" dirty="0"/>
+            </a:br>
+            <a:endParaRPr lang="en-US" dirty="0"/>
+          </a:p>
+          <a:p>
+            <a:r>
+              <a:rPr lang="en-US" dirty="0"/>
+              <a:t>THIS IS ANNOYING</a:t>
+            </a:r>
+          </a:p>
+          <a:p>
+            <a:pPr lvl="1"/>
+            <a:r>
+              <a:rPr lang="en-US" dirty="0"/>
+              <a:t>Not all libs use CMake, many do not keep up with the new standards</a:t>
+            </a:r>
+          </a:p>
+          <a:p>
+            <a:pPr lvl="1"/>
+            <a:r>
+              <a:rPr lang="en-US" dirty="0"/>
+              <a:t>Updating libs is pain (e.g. after installing a new compiler)</a:t>
+            </a:r>
+          </a:p>
+          <a:p>
+            <a:pPr lvl="1"/>
+            <a:r>
+              <a:rPr lang="en-US" dirty="0"/>
+              <a:t>Finding out the correct package to include is not as easy as it should be</a:t>
+            </a:r>
+          </a:p>
+          <a:p>
+            <a:endParaRPr lang="en-US" dirty="0"/>
           </a:p>
         </p:txBody>
       </p:sp>
     </p:spTree>
     <p:extLst>
       <p:ext uri="{BB962C8B-B14F-4D97-AF65-F5344CB8AC3E}">
-        <p14:creationId xmlns:p14="http://schemas.microsoft.com/office/powerpoint/2010/main" val="3482716011"/>
+        <p14:creationId xmlns:p14="http://schemas.microsoft.com/office/powerpoint/2010/main" val="4083439808"/>
       </p:ext>
     </p:extLst>
   </p:cSld>
@@ -3657,102 +3658,33 @@
           <p:cNvPr id="2" name="Titel 1">
             <a:extLst>
               <a:ext uri="{FF2B5EF4-FFF2-40B4-BE49-F238E27FC236}">
-                <a16:creationId xmlns:a16="http://schemas.microsoft.com/office/drawing/2014/main" id="{6F730A00-C52C-46DD-AE40-730A23AA1520}"/>
-              </a:ext>
-            </a:extLst>
-          </p:cNvPr>
-          <p:cNvSpPr>
-            <a:spLocks noGrp="1"/>
-          </p:cNvSpPr>
-          <p:nvPr>
-            <p:ph type="title"/>
-          </p:nvPr>
-        </p:nvSpPr>
-        <p:spPr/>
-        <p:txBody>
-          <a:bodyPr/>
-          <a:lstStyle/>
-          <a:p>
-            <a:r>
-              <a:rPr lang="en-US" dirty="0" err="1"/>
-              <a:t>vcpkg</a:t>
-            </a:r>
-            <a:endParaRPr lang="en-US" dirty="0"/>
-          </a:p>
-        </p:txBody>
-      </p:sp>
-      <p:sp>
-        <p:nvSpPr>
-          <p:cNvPr id="3" name="Inhaltsplatzhalter 2">
-            <a:extLst>
-              <a:ext uri="{FF2B5EF4-FFF2-40B4-BE49-F238E27FC236}">
-                <a16:creationId xmlns:a16="http://schemas.microsoft.com/office/drawing/2014/main" id="{0788A52D-6182-4726-8259-894E856AF4ED}"/>
-              </a:ext>
-            </a:extLst>
-          </p:cNvPr>
-          <p:cNvSpPr>
-            <a:spLocks noGrp="1"/>
-          </p:cNvSpPr>
-          <p:nvPr>
-            <p:ph idx="1"/>
-          </p:nvPr>
-        </p:nvSpPr>
-        <p:spPr/>
-        <p:txBody>
-          <a:bodyPr/>
-          <a:lstStyle/>
-          <a:p>
-            <a:r>
-              <a:rPr lang="en-US" dirty="0"/>
-              <a:t>Requirements: </a:t>
-            </a:r>
-          </a:p>
-          <a:p>
-            <a:pPr lvl="1"/>
-            <a:r>
-              <a:rPr lang="en-US" dirty="0"/>
-              <a:t>Git</a:t>
-            </a:r>
-          </a:p>
-          <a:p>
-            <a:pPr lvl="1"/>
-            <a:r>
-              <a:rPr lang="en-US" dirty="0"/>
-              <a:t>On Windows: Visual Studio with the </a:t>
-            </a:r>
-            <a:r>
-              <a:rPr lang="en-US" b="1" dirty="0"/>
-              <a:t>English language pack</a:t>
-            </a:r>
-          </a:p>
-          <a:p>
-            <a:r>
-              <a:rPr lang="en-US" dirty="0"/>
-              <a:t>Follow instructions on</a:t>
-            </a:r>
-            <a:br>
-              <a:rPr lang="en-US" dirty="0"/>
-            </a:br>
-            <a:r>
-              <a:rPr lang="en-US" dirty="0">
-                <a:hlinkClick r:id="rId2"/>
-              </a:rPr>
-              <a:t>https://github.com/microsoft/vcpkg</a:t>
-            </a:r>
-            <a:endParaRPr lang="en-US" dirty="0"/>
-          </a:p>
-          <a:p>
-            <a:endParaRPr lang="en-US" dirty="0"/>
-          </a:p>
-          <a:p>
-            <a:endParaRPr lang="en-US" dirty="0"/>
+                <a16:creationId xmlns:a16="http://schemas.microsoft.com/office/drawing/2014/main" id="{5E801DC5-9E65-44F3-88CF-84AD1C85B2C1}"/>
+              </a:ext>
+            </a:extLst>
+          </p:cNvPr>
+          <p:cNvSpPr>
+            <a:spLocks noGrp="1"/>
+          </p:cNvSpPr>
+          <p:nvPr>
+            <p:ph type="ctrTitle"/>
+          </p:nvPr>
+        </p:nvSpPr>
+        <p:spPr/>
+        <p:txBody>
+          <a:bodyPr/>
+          <a:lstStyle/>
+          <a:p>
+            <a:r>
+              <a:rPr lang="en-US" dirty="0"/>
+              <a:t>ex04_fetch_content</a:t>
+            </a:r>
           </a:p>
         </p:txBody>
       </p:sp>
     </p:spTree>
     <p:extLst>
       <p:ext uri="{BB962C8B-B14F-4D97-AF65-F5344CB8AC3E}">
-        <p14:creationId xmlns:p14="http://schemas.microsoft.com/office/powerpoint/2010/main" val="4234258022"/>
+        <p14:creationId xmlns:p14="http://schemas.microsoft.com/office/powerpoint/2010/main" val="3482716011"/>
       </p:ext>
     </p:extLst>
   </p:cSld>
@@ -3784,33 +3716,102 @@
           <p:cNvPr id="2" name="Titel 1">
             <a:extLst>
               <a:ext uri="{FF2B5EF4-FFF2-40B4-BE49-F238E27FC236}">
-                <a16:creationId xmlns:a16="http://schemas.microsoft.com/office/drawing/2014/main" id="{5E801DC5-9E65-44F3-88CF-84AD1C85B2C1}"/>
-              </a:ext>
-            </a:extLst>
-          </p:cNvPr>
-          <p:cNvSpPr>
-            <a:spLocks noGrp="1"/>
-          </p:cNvSpPr>
-          <p:nvPr>
-            <p:ph type="ctrTitle"/>
-          </p:nvPr>
-        </p:nvSpPr>
-        <p:spPr/>
-        <p:txBody>
-          <a:bodyPr/>
-          <a:lstStyle/>
-          <a:p>
-            <a:r>
-              <a:rPr lang="en-US" dirty="0"/>
-              <a:t>ex05_vcpkg</a:t>
-            </a:r>
+                <a16:creationId xmlns:a16="http://schemas.microsoft.com/office/drawing/2014/main" id="{6F730A00-C52C-46DD-AE40-730A23AA1520}"/>
+              </a:ext>
+            </a:extLst>
+          </p:cNvPr>
+          <p:cNvSpPr>
+            <a:spLocks noGrp="1"/>
+          </p:cNvSpPr>
+          <p:nvPr>
+            <p:ph type="title"/>
+          </p:nvPr>
+        </p:nvSpPr>
+        <p:spPr/>
+        <p:txBody>
+          <a:bodyPr/>
+          <a:lstStyle/>
+          <a:p>
+            <a:r>
+              <a:rPr lang="en-US" dirty="0" err="1"/>
+              <a:t>vcpkg</a:t>
+            </a:r>
+            <a:endParaRPr lang="en-US" dirty="0"/>
+          </a:p>
+        </p:txBody>
+      </p:sp>
+      <p:sp>
+        <p:nvSpPr>
+          <p:cNvPr id="3" name="Inhaltsplatzhalter 2">
+            <a:extLst>
+              <a:ext uri="{FF2B5EF4-FFF2-40B4-BE49-F238E27FC236}">
+                <a16:creationId xmlns:a16="http://schemas.microsoft.com/office/drawing/2014/main" id="{0788A52D-6182-4726-8259-894E856AF4ED}"/>
+              </a:ext>
+            </a:extLst>
+          </p:cNvPr>
+          <p:cNvSpPr>
+            <a:spLocks noGrp="1"/>
+          </p:cNvSpPr>
+          <p:nvPr>
+            <p:ph idx="1"/>
+          </p:nvPr>
+        </p:nvSpPr>
+        <p:spPr/>
+        <p:txBody>
+          <a:bodyPr/>
+          <a:lstStyle/>
+          <a:p>
+            <a:r>
+              <a:rPr lang="en-US" dirty="0"/>
+              <a:t>Requirements: </a:t>
+            </a:r>
+          </a:p>
+          <a:p>
+            <a:pPr lvl="1"/>
+            <a:r>
+              <a:rPr lang="en-US" dirty="0"/>
+              <a:t>Git</a:t>
+            </a:r>
+          </a:p>
+          <a:p>
+            <a:pPr lvl="1"/>
+            <a:r>
+              <a:rPr lang="en-US" dirty="0"/>
+              <a:t>On Windows: Visual Studio with the </a:t>
+            </a:r>
+            <a:r>
+              <a:rPr lang="en-US" b="1" dirty="0"/>
+              <a:t>English language pack</a:t>
+            </a:r>
+          </a:p>
+          <a:p>
+            <a:r>
+              <a:rPr lang="en-US" dirty="0"/>
+              <a:t>Follow instructions on</a:t>
+            </a:r>
+            <a:br>
+              <a:rPr lang="en-US" dirty="0"/>
+            </a:br>
+            <a:r>
+              <a:rPr lang="en-US" dirty="0">
+                <a:hlinkClick r:id="rId2"/>
+              </a:rPr>
+              <a:t>https://github.com/microsoft/vcpkg</a:t>
+            </a:r>
+            <a:endParaRPr lang="en-US" dirty="0"/>
+          </a:p>
+          <a:p>
+            <a:endParaRPr lang="en-US" dirty="0"/>
+          </a:p>
+          <a:p>
+            <a:endParaRPr lang="en-US" dirty="0"/>
           </a:p>
         </p:txBody>
       </p:sp>
     </p:spTree>
     <p:extLst>
       <p:ext uri="{BB962C8B-B14F-4D97-AF65-F5344CB8AC3E}">
-        <p14:creationId xmlns:p14="http://schemas.microsoft.com/office/powerpoint/2010/main" val="2018940438"/>
+        <p14:creationId xmlns:p14="http://schemas.microsoft.com/office/powerpoint/2010/main" val="4234258022"/>
       </p:ext>
     </p:extLst>
   </p:cSld>
@@ -3860,7 +3861,7 @@
           <a:p>
             <a:r>
               <a:rPr lang="en-US" dirty="0"/>
-              <a:t>ex06_vcpkg_manifest</a:t>
+              <a:t>ex05_vcpkg</a:t>
             </a:r>
           </a:p>
         </p:txBody>
@@ -3868,7 +3869,7 @@
     </p:spTree>
     <p:extLst>
       <p:ext uri="{BB962C8B-B14F-4D97-AF65-F5344CB8AC3E}">
-        <p14:creationId xmlns:p14="http://schemas.microsoft.com/office/powerpoint/2010/main" val="478243532"/>
+        <p14:creationId xmlns:p14="http://schemas.microsoft.com/office/powerpoint/2010/main" val="2018940438"/>
       </p:ext>
     </p:extLst>
   </p:cSld>
@@ -3918,6 +3919,64 @@
           <a:p>
             <a:r>
               <a:rPr lang="en-US" dirty="0"/>
+              <a:t>ex06_vcpkg_manifest</a:t>
+            </a:r>
+          </a:p>
+        </p:txBody>
+      </p:sp>
+    </p:spTree>
+    <p:extLst>
+      <p:ext uri="{BB962C8B-B14F-4D97-AF65-F5344CB8AC3E}">
+        <p14:creationId xmlns:p14="http://schemas.microsoft.com/office/powerpoint/2010/main" val="478243532"/>
+      </p:ext>
+    </p:extLst>
+  </p:cSld>
+  <p:clrMapOvr>
+    <a:masterClrMapping/>
+  </p:clrMapOvr>
+</p:sld>
+</file>
+
+<file path=ppt/slides/slide16.xml><?xml version="1.0" encoding="utf-8"?>
+<p:sld xmlns:a="http://schemas.openxmlformats.org/drawingml/2006/main" xmlns:r="http://schemas.openxmlformats.org/officeDocument/2006/relationships" xmlns:p="http://schemas.openxmlformats.org/presentationml/2006/main">
+  <p:cSld>
+    <p:spTree>
+      <p:nvGrpSpPr>
+        <p:cNvPr id="1" name=""/>
+        <p:cNvGrpSpPr/>
+        <p:nvPr/>
+      </p:nvGrpSpPr>
+      <p:grpSpPr>
+        <a:xfrm>
+          <a:off x="0" y="0"/>
+          <a:ext cx="0" cy="0"/>
+          <a:chOff x="0" y="0"/>
+          <a:chExt cx="0" cy="0"/>
+        </a:xfrm>
+      </p:grpSpPr>
+      <p:sp>
+        <p:nvSpPr>
+          <p:cNvPr id="2" name="Titel 1">
+            <a:extLst>
+              <a:ext uri="{FF2B5EF4-FFF2-40B4-BE49-F238E27FC236}">
+                <a16:creationId xmlns:a16="http://schemas.microsoft.com/office/drawing/2014/main" id="{5E801DC5-9E65-44F3-88CF-84AD1C85B2C1}"/>
+              </a:ext>
+            </a:extLst>
+          </p:cNvPr>
+          <p:cNvSpPr>
+            <a:spLocks noGrp="1"/>
+          </p:cNvSpPr>
+          <p:nvPr>
+            <p:ph type="ctrTitle"/>
+          </p:nvPr>
+        </p:nvSpPr>
+        <p:spPr/>
+        <p:txBody>
+          <a:bodyPr/>
+          <a:lstStyle/>
+          <a:p>
+            <a:r>
+              <a:rPr lang="en-US" dirty="0"/>
               <a:t>ex07_config_file</a:t>
             </a:r>
           </a:p>
@@ -3936,7 +3995,7 @@
 </p:sld>
 </file>
 
-<file path=ppt/slides/slide16.xml><?xml version="1.0" encoding="utf-8"?>
+<file path=ppt/slides/slide17.xml><?xml version="1.0" encoding="utf-8"?>
 <p:sld xmlns:a="http://schemas.openxmlformats.org/drawingml/2006/main" xmlns:r="http://schemas.openxmlformats.org/officeDocument/2006/relationships" xmlns:p="http://schemas.openxmlformats.org/presentationml/2006/main">
   <p:cSld>
     <p:spTree>
@@ -4409,10 +4468,10 @@
       </p:grpSpPr>
       <p:sp>
         <p:nvSpPr>
-          <p:cNvPr id="2" name="Titel 1">
-            <a:extLst>
-              <a:ext uri="{FF2B5EF4-FFF2-40B4-BE49-F238E27FC236}">
-                <a16:creationId xmlns:a16="http://schemas.microsoft.com/office/drawing/2014/main" id="{8B9606E2-550A-400C-A050-C25FB549EAF4}"/>
+          <p:cNvPr id="2" name="Title 1">
+            <a:extLst>
+              <a:ext uri="{FF2B5EF4-FFF2-40B4-BE49-F238E27FC236}">
+                <a16:creationId xmlns:a16="http://schemas.microsoft.com/office/drawing/2014/main" id="{31F77D3A-F8AC-DB3A-2CC1-D63D1024FD2A}"/>
               </a:ext>
             </a:extLst>
           </p:cNvPr>
@@ -4430,25 +4489,22 @@
           <a:p>
             <a:r>
               <a:rPr lang="en-US" dirty="0"/>
-              <a:t>Simplest </a:t>
+              <a:t>Introduction to Modern </a:t>
             </a:r>
             <a:r>
               <a:rPr lang="en-US" dirty="0" err="1"/>
-              <a:t>Cmake</a:t>
-            </a:r>
-            <a:r>
-              <a:rPr lang="en-US" dirty="0"/>
-              <a:t> Project</a:t>
-            </a:r>
-          </a:p>
-        </p:txBody>
-      </p:sp>
-      <p:sp>
-        <p:nvSpPr>
-          <p:cNvPr id="3" name="Inhaltsplatzhalter 2">
-            <a:extLst>
-              <a:ext uri="{FF2B5EF4-FFF2-40B4-BE49-F238E27FC236}">
-                <a16:creationId xmlns:a16="http://schemas.microsoft.com/office/drawing/2014/main" id="{68682089-99A5-40E8-966C-724218B0ED0C}"/>
+              <a:t>CMake</a:t>
+            </a:r>
+            <a:endParaRPr lang="en-US" dirty="0"/>
+          </a:p>
+        </p:txBody>
+      </p:sp>
+      <p:sp>
+        <p:nvSpPr>
+          <p:cNvPr id="3" name="Content Placeholder 2">
+            <a:extLst>
+              <a:ext uri="{FF2B5EF4-FFF2-40B4-BE49-F238E27FC236}">
+                <a16:creationId xmlns:a16="http://schemas.microsoft.com/office/drawing/2014/main" id="{46D5AF5E-D497-08ED-E320-57B58FC3E096}"/>
               </a:ext>
             </a:extLst>
           </p:cNvPr>
@@ -4466,49 +4522,43 @@
           <a:p>
             <a:r>
               <a:rPr lang="en-US" dirty="0"/>
-              <a:t>A very simple example but not recommended!</a:t>
-            </a:r>
-          </a:p>
-          <a:p>
-            <a:r>
-              <a:rPr lang="en-US" dirty="0"/>
-              <a:t>You want to have:</a:t>
-            </a:r>
-          </a:p>
-          <a:p>
-            <a:pPr lvl="1"/>
-            <a:r>
-              <a:rPr lang="en-US" dirty="0"/>
-              <a:t>Warnings/Errors</a:t>
-            </a:r>
-          </a:p>
-          <a:p>
-            <a:pPr lvl="1"/>
-            <a:r>
-              <a:rPr lang="en-US" dirty="0"/>
-              <a:t>Variables</a:t>
-            </a:r>
-          </a:p>
-          <a:p>
-            <a:pPr lvl="1"/>
-            <a:r>
-              <a:rPr lang="en-US" dirty="0"/>
-              <a:t>Structure</a:t>
-            </a:r>
-          </a:p>
-          <a:p>
-            <a:pPr lvl="1"/>
-            <a:r>
-              <a:rPr lang="en-US" dirty="0"/>
-              <a:t>…</a:t>
-            </a:r>
+              <a:t>Much better documentation</a:t>
+            </a:r>
+          </a:p>
+          <a:p>
+            <a:r>
+              <a:rPr lang="en-US" dirty="0"/>
+              <a:t>Covers all the important stuff</a:t>
+            </a:r>
+            <a:br>
+              <a:rPr lang="en-US" dirty="0"/>
+            </a:br>
+            <a:br>
+              <a:rPr lang="en-US" dirty="0"/>
+            </a:br>
+            <a:br>
+              <a:rPr lang="en-US" dirty="0"/>
+            </a:br>
+            <a:br>
+              <a:rPr lang="en-US" dirty="0"/>
+            </a:br>
+            <a:r>
+              <a:rPr lang="en-US" dirty="0">
+                <a:hlinkClick r:id="rId2"/>
+              </a:rPr>
+              <a:t>https://cliutils.gitlab.io/modern-cmake/</a:t>
+            </a:r>
+            <a:endParaRPr lang="en-US" dirty="0"/>
+          </a:p>
+          <a:p>
+            <a:endParaRPr lang="en-US" dirty="0"/>
           </a:p>
         </p:txBody>
       </p:sp>
     </p:spTree>
     <p:extLst>
       <p:ext uri="{BB962C8B-B14F-4D97-AF65-F5344CB8AC3E}">
-        <p14:creationId xmlns:p14="http://schemas.microsoft.com/office/powerpoint/2010/main" val="1587378211"/>
+        <p14:creationId xmlns:p14="http://schemas.microsoft.com/office/powerpoint/2010/main" val="2904244162"/>
       </p:ext>
     </p:extLst>
   </p:cSld>
@@ -4540,25 +4590,95 @@
           <p:cNvPr id="2" name="Titel 1">
             <a:extLst>
               <a:ext uri="{FF2B5EF4-FFF2-40B4-BE49-F238E27FC236}">
-                <a16:creationId xmlns:a16="http://schemas.microsoft.com/office/drawing/2014/main" id="{5E801DC5-9E65-44F3-88CF-84AD1C85B2C1}"/>
-              </a:ext>
-            </a:extLst>
-          </p:cNvPr>
-          <p:cNvSpPr>
-            <a:spLocks noGrp="1"/>
-          </p:cNvSpPr>
-          <p:nvPr>
-            <p:ph type="ctrTitle"/>
-          </p:nvPr>
-        </p:nvSpPr>
-        <p:spPr/>
-        <p:txBody>
-          <a:bodyPr/>
-          <a:lstStyle/>
-          <a:p>
-            <a:r>
-              <a:rPr lang="en-US" dirty="0"/>
-              <a:t>ex01_cmake_simple</a:t>
+                <a16:creationId xmlns:a16="http://schemas.microsoft.com/office/drawing/2014/main" id="{8B9606E2-550A-400C-A050-C25FB549EAF4}"/>
+              </a:ext>
+            </a:extLst>
+          </p:cNvPr>
+          <p:cNvSpPr>
+            <a:spLocks noGrp="1"/>
+          </p:cNvSpPr>
+          <p:nvPr>
+            <p:ph type="title"/>
+          </p:nvPr>
+        </p:nvSpPr>
+        <p:spPr/>
+        <p:txBody>
+          <a:bodyPr/>
+          <a:lstStyle/>
+          <a:p>
+            <a:r>
+              <a:rPr lang="en-US" dirty="0"/>
+              <a:t>Simplest </a:t>
+            </a:r>
+            <a:r>
+              <a:rPr lang="en-US" dirty="0" err="1"/>
+              <a:t>Cmake</a:t>
+            </a:r>
+            <a:r>
+              <a:rPr lang="en-US" dirty="0"/>
+              <a:t> Project</a:t>
+            </a:r>
+          </a:p>
+        </p:txBody>
+      </p:sp>
+      <p:sp>
+        <p:nvSpPr>
+          <p:cNvPr id="3" name="Inhaltsplatzhalter 2">
+            <a:extLst>
+              <a:ext uri="{FF2B5EF4-FFF2-40B4-BE49-F238E27FC236}">
+                <a16:creationId xmlns:a16="http://schemas.microsoft.com/office/drawing/2014/main" id="{68682089-99A5-40E8-966C-724218B0ED0C}"/>
+              </a:ext>
+            </a:extLst>
+          </p:cNvPr>
+          <p:cNvSpPr>
+            <a:spLocks noGrp="1"/>
+          </p:cNvSpPr>
+          <p:nvPr>
+            <p:ph idx="1"/>
+          </p:nvPr>
+        </p:nvSpPr>
+        <p:spPr/>
+        <p:txBody>
+          <a:bodyPr/>
+          <a:lstStyle/>
+          <a:p>
+            <a:r>
+              <a:rPr lang="en-US" dirty="0"/>
+              <a:t>A very simple example but not recommended!</a:t>
+            </a:r>
+          </a:p>
+          <a:p>
+            <a:r>
+              <a:rPr lang="en-US" dirty="0"/>
+              <a:t>You want to have:</a:t>
+            </a:r>
+          </a:p>
+          <a:p>
+            <a:pPr lvl="1"/>
+            <a:r>
+              <a:rPr lang="en-US" dirty="0"/>
+              <a:t>Warnings/Errors</a:t>
+            </a:r>
+          </a:p>
+          <a:p>
+            <a:pPr lvl="1"/>
+            <a:r>
+              <a:rPr lang="en-US" dirty="0"/>
+              <a:t>Variables</a:t>
+            </a:r>
+          </a:p>
+          <a:p>
+            <a:pPr lvl="1"/>
+            <a:r>
+              <a:rPr lang="en-US" dirty="0"/>
+              <a:t>Structure</a:t>
+            </a:r>
+          </a:p>
+          <a:p>
+            <a:pPr lvl="1"/>
+            <a:r>
+              <a:rPr lang="en-US" dirty="0"/>
+              <a:t>…</a:t>
             </a:r>
           </a:p>
         </p:txBody>
@@ -4566,7 +4686,7 @@
     </p:spTree>
     <p:extLst>
       <p:ext uri="{BB962C8B-B14F-4D97-AF65-F5344CB8AC3E}">
-        <p14:creationId xmlns:p14="http://schemas.microsoft.com/office/powerpoint/2010/main" val="20660935"/>
+        <p14:creationId xmlns:p14="http://schemas.microsoft.com/office/powerpoint/2010/main" val="1587378211"/>
       </p:ext>
     </p:extLst>
   </p:cSld>
@@ -4598,95 +4718,25 @@
           <p:cNvPr id="2" name="Titel 1">
             <a:extLst>
               <a:ext uri="{FF2B5EF4-FFF2-40B4-BE49-F238E27FC236}">
-                <a16:creationId xmlns:a16="http://schemas.microsoft.com/office/drawing/2014/main" id="{8B9606E2-550A-400C-A050-C25FB549EAF4}"/>
-              </a:ext>
-            </a:extLst>
-          </p:cNvPr>
-          <p:cNvSpPr>
-            <a:spLocks noGrp="1"/>
-          </p:cNvSpPr>
-          <p:nvPr>
-            <p:ph type="title"/>
-          </p:nvPr>
-        </p:nvSpPr>
-        <p:spPr/>
-        <p:txBody>
-          <a:bodyPr/>
-          <a:lstStyle/>
-          <a:p>
-            <a:r>
-              <a:rPr lang="en-US" dirty="0"/>
-              <a:t>Advanced </a:t>
-            </a:r>
-            <a:r>
-              <a:rPr lang="en-US" dirty="0" err="1"/>
-              <a:t>Cmake</a:t>
-            </a:r>
-            <a:r>
-              <a:rPr lang="en-US" dirty="0"/>
-              <a:t> Project</a:t>
-            </a:r>
-          </a:p>
-        </p:txBody>
-      </p:sp>
-      <p:sp>
-        <p:nvSpPr>
-          <p:cNvPr id="3" name="Inhaltsplatzhalter 2">
-            <a:extLst>
-              <a:ext uri="{FF2B5EF4-FFF2-40B4-BE49-F238E27FC236}">
-                <a16:creationId xmlns:a16="http://schemas.microsoft.com/office/drawing/2014/main" id="{68682089-99A5-40E8-966C-724218B0ED0C}"/>
-              </a:ext>
-            </a:extLst>
-          </p:cNvPr>
-          <p:cNvSpPr>
-            <a:spLocks noGrp="1"/>
-          </p:cNvSpPr>
-          <p:nvPr>
-            <p:ph idx="1"/>
-          </p:nvPr>
-        </p:nvSpPr>
-        <p:spPr/>
-        <p:txBody>
-          <a:bodyPr/>
-          <a:lstStyle/>
-          <a:p>
-            <a:r>
-              <a:rPr lang="en-US" dirty="0"/>
-              <a:t>Set a minimum version for CMake</a:t>
-            </a:r>
-          </a:p>
-          <a:p>
-            <a:r>
-              <a:rPr lang="en-US" dirty="0"/>
-              <a:t>You want to have:</a:t>
-            </a:r>
-          </a:p>
-          <a:p>
-            <a:pPr lvl="1"/>
-            <a:r>
-              <a:rPr lang="en-US" dirty="0"/>
-              <a:t>Warnings/Errors</a:t>
-            </a:r>
-          </a:p>
-          <a:p>
-            <a:pPr lvl="1"/>
-            <a:r>
-              <a:rPr lang="en-US" dirty="0"/>
-              <a:t>Variables</a:t>
-            </a:r>
-          </a:p>
-          <a:p>
-            <a:pPr lvl="1"/>
-            <a:r>
-              <a:rPr lang="en-US" dirty="0"/>
-              <a:t>Structure</a:t>
-            </a:r>
-          </a:p>
-          <a:p>
-            <a:pPr lvl="1"/>
-            <a:r>
-              <a:rPr lang="en-US" dirty="0"/>
-              <a:t>…</a:t>
+                <a16:creationId xmlns:a16="http://schemas.microsoft.com/office/drawing/2014/main" id="{5E801DC5-9E65-44F3-88CF-84AD1C85B2C1}"/>
+              </a:ext>
+            </a:extLst>
+          </p:cNvPr>
+          <p:cNvSpPr>
+            <a:spLocks noGrp="1"/>
+          </p:cNvSpPr>
+          <p:nvPr>
+            <p:ph type="ctrTitle"/>
+          </p:nvPr>
+        </p:nvSpPr>
+        <p:spPr/>
+        <p:txBody>
+          <a:bodyPr/>
+          <a:lstStyle/>
+          <a:p>
+            <a:r>
+              <a:rPr lang="en-US" dirty="0"/>
+              <a:t>ex01_cmake_simple</a:t>
             </a:r>
           </a:p>
         </p:txBody>
@@ -4694,7 +4744,7 @@
     </p:spTree>
     <p:extLst>
       <p:ext uri="{BB962C8B-B14F-4D97-AF65-F5344CB8AC3E}">
-        <p14:creationId xmlns:p14="http://schemas.microsoft.com/office/powerpoint/2010/main" val="2558844500"/>
+        <p14:creationId xmlns:p14="http://schemas.microsoft.com/office/powerpoint/2010/main" val="20660935"/>
       </p:ext>
     </p:extLst>
   </p:cSld>
@@ -4726,25 +4776,95 @@
           <p:cNvPr id="2" name="Titel 1">
             <a:extLst>
               <a:ext uri="{FF2B5EF4-FFF2-40B4-BE49-F238E27FC236}">
-                <a16:creationId xmlns:a16="http://schemas.microsoft.com/office/drawing/2014/main" id="{5E801DC5-9E65-44F3-88CF-84AD1C85B2C1}"/>
-              </a:ext>
-            </a:extLst>
-          </p:cNvPr>
-          <p:cNvSpPr>
-            <a:spLocks noGrp="1"/>
-          </p:cNvSpPr>
-          <p:nvPr>
-            <p:ph type="ctrTitle"/>
-          </p:nvPr>
-        </p:nvSpPr>
-        <p:spPr/>
-        <p:txBody>
-          <a:bodyPr/>
-          <a:lstStyle/>
-          <a:p>
-            <a:r>
-              <a:rPr lang="en-US" dirty="0"/>
-              <a:t>ex02_cmake_better</a:t>
+                <a16:creationId xmlns:a16="http://schemas.microsoft.com/office/drawing/2014/main" id="{8B9606E2-550A-400C-A050-C25FB549EAF4}"/>
+              </a:ext>
+            </a:extLst>
+          </p:cNvPr>
+          <p:cNvSpPr>
+            <a:spLocks noGrp="1"/>
+          </p:cNvSpPr>
+          <p:nvPr>
+            <p:ph type="title"/>
+          </p:nvPr>
+        </p:nvSpPr>
+        <p:spPr/>
+        <p:txBody>
+          <a:bodyPr/>
+          <a:lstStyle/>
+          <a:p>
+            <a:r>
+              <a:rPr lang="en-US" dirty="0"/>
+              <a:t>Advanced </a:t>
+            </a:r>
+            <a:r>
+              <a:rPr lang="en-US" dirty="0" err="1"/>
+              <a:t>Cmake</a:t>
+            </a:r>
+            <a:r>
+              <a:rPr lang="en-US" dirty="0"/>
+              <a:t> Project</a:t>
+            </a:r>
+          </a:p>
+        </p:txBody>
+      </p:sp>
+      <p:sp>
+        <p:nvSpPr>
+          <p:cNvPr id="3" name="Inhaltsplatzhalter 2">
+            <a:extLst>
+              <a:ext uri="{FF2B5EF4-FFF2-40B4-BE49-F238E27FC236}">
+                <a16:creationId xmlns:a16="http://schemas.microsoft.com/office/drawing/2014/main" id="{68682089-99A5-40E8-966C-724218B0ED0C}"/>
+              </a:ext>
+            </a:extLst>
+          </p:cNvPr>
+          <p:cNvSpPr>
+            <a:spLocks noGrp="1"/>
+          </p:cNvSpPr>
+          <p:nvPr>
+            <p:ph idx="1"/>
+          </p:nvPr>
+        </p:nvSpPr>
+        <p:spPr/>
+        <p:txBody>
+          <a:bodyPr/>
+          <a:lstStyle/>
+          <a:p>
+            <a:r>
+              <a:rPr lang="en-US" dirty="0"/>
+              <a:t>Set a minimum version for CMake</a:t>
+            </a:r>
+          </a:p>
+          <a:p>
+            <a:r>
+              <a:rPr lang="en-US" dirty="0"/>
+              <a:t>You want to have:</a:t>
+            </a:r>
+          </a:p>
+          <a:p>
+            <a:pPr lvl="1"/>
+            <a:r>
+              <a:rPr lang="en-US" dirty="0"/>
+              <a:t>Warnings/Errors</a:t>
+            </a:r>
+          </a:p>
+          <a:p>
+            <a:pPr lvl="1"/>
+            <a:r>
+              <a:rPr lang="en-US" dirty="0"/>
+              <a:t>Variables</a:t>
+            </a:r>
+          </a:p>
+          <a:p>
+            <a:pPr lvl="1"/>
+            <a:r>
+              <a:rPr lang="en-US" dirty="0"/>
+              <a:t>Structure</a:t>
+            </a:r>
+          </a:p>
+          <a:p>
+            <a:pPr lvl="1"/>
+            <a:r>
+              <a:rPr lang="en-US" dirty="0"/>
+              <a:t>…</a:t>
             </a:r>
           </a:p>
         </p:txBody>
@@ -4752,7 +4872,7 @@
     </p:spTree>
     <p:extLst>
       <p:ext uri="{BB962C8B-B14F-4D97-AF65-F5344CB8AC3E}">
-        <p14:creationId xmlns:p14="http://schemas.microsoft.com/office/powerpoint/2010/main" val="2553740266"/>
+        <p14:creationId xmlns:p14="http://schemas.microsoft.com/office/powerpoint/2010/main" val="2558844500"/>
       </p:ext>
     </p:extLst>
   </p:cSld>
@@ -4802,7 +4922,7 @@
           <a:p>
             <a:r>
               <a:rPr lang="en-US" dirty="0"/>
-              <a:t>ex03_libs</a:t>
+              <a:t>ex02_cmake_better</a:t>
             </a:r>
           </a:p>
         </p:txBody>
@@ -4810,7 +4930,7 @@
     </p:spTree>
     <p:extLst>
       <p:ext uri="{BB962C8B-B14F-4D97-AF65-F5344CB8AC3E}">
-        <p14:creationId xmlns:p14="http://schemas.microsoft.com/office/powerpoint/2010/main" val="2957862683"/>
+        <p14:creationId xmlns:p14="http://schemas.microsoft.com/office/powerpoint/2010/main" val="2553740266"/>
       </p:ext>
     </p:extLst>
   </p:cSld>

</xml_diff>